<commit_message>
updated litterature review ppt
</commit_message>
<xml_diff>
--- a/Temporal networks analysis.pptx
+++ b/Temporal networks analysis.pptx
@@ -113,6 +113,11 @@
       </a:defRPr>
     </a:lvl9pPr>
   </p:defaultTextStyle>
+  <p:extLst>
+    <p:ext uri="{EFAFB233-063F-42B5-8137-9DF3F51BA10A}">
+      <p15:sldGuideLst xmlns:p15="http://schemas.microsoft.com/office/powerpoint/2012/main"/>
+    </p:ext>
+  </p:extLst>
 </p:presentation>
 </file>
 
@@ -247,7 +252,7 @@
           <a:p>
             <a:fld id="{2D08528A-76E3-4B57-B31D-3A5F3E8689E2}" type="datetimeFigureOut">
               <a:rPr lang="de-DE" smtClean="0"/>
-              <a:t>08.07.2025</a:t>
+              <a:t>10.07.2025</a:t>
             </a:fld>
             <a:endParaRPr lang="de-DE"/>
           </a:p>
@@ -417,7 +422,7 @@
           <a:p>
             <a:fld id="{2D08528A-76E3-4B57-B31D-3A5F3E8689E2}" type="datetimeFigureOut">
               <a:rPr lang="de-DE" smtClean="0"/>
-              <a:t>08.07.2025</a:t>
+              <a:t>10.07.2025</a:t>
             </a:fld>
             <a:endParaRPr lang="de-DE"/>
           </a:p>
@@ -597,7 +602,7 @@
           <a:p>
             <a:fld id="{2D08528A-76E3-4B57-B31D-3A5F3E8689E2}" type="datetimeFigureOut">
               <a:rPr lang="de-DE" smtClean="0"/>
-              <a:t>08.07.2025</a:t>
+              <a:t>10.07.2025</a:t>
             </a:fld>
             <a:endParaRPr lang="de-DE"/>
           </a:p>
@@ -767,7 +772,7 @@
           <a:p>
             <a:fld id="{2D08528A-76E3-4B57-B31D-3A5F3E8689E2}" type="datetimeFigureOut">
               <a:rPr lang="de-DE" smtClean="0"/>
-              <a:t>08.07.2025</a:t>
+              <a:t>10.07.2025</a:t>
             </a:fld>
             <a:endParaRPr lang="de-DE"/>
           </a:p>
@@ -1013,7 +1018,7 @@
           <a:p>
             <a:fld id="{2D08528A-76E3-4B57-B31D-3A5F3E8689E2}" type="datetimeFigureOut">
               <a:rPr lang="de-DE" smtClean="0"/>
-              <a:t>08.07.2025</a:t>
+              <a:t>10.07.2025</a:t>
             </a:fld>
             <a:endParaRPr lang="de-DE"/>
           </a:p>
@@ -1245,7 +1250,7 @@
           <a:p>
             <a:fld id="{2D08528A-76E3-4B57-B31D-3A5F3E8689E2}" type="datetimeFigureOut">
               <a:rPr lang="de-DE" smtClean="0"/>
-              <a:t>08.07.2025</a:t>
+              <a:t>10.07.2025</a:t>
             </a:fld>
             <a:endParaRPr lang="de-DE"/>
           </a:p>
@@ -1612,7 +1617,7 @@
           <a:p>
             <a:fld id="{2D08528A-76E3-4B57-B31D-3A5F3E8689E2}" type="datetimeFigureOut">
               <a:rPr lang="de-DE" smtClean="0"/>
-              <a:t>08.07.2025</a:t>
+              <a:t>10.07.2025</a:t>
             </a:fld>
             <a:endParaRPr lang="de-DE"/>
           </a:p>
@@ -1730,7 +1735,7 @@
           <a:p>
             <a:fld id="{2D08528A-76E3-4B57-B31D-3A5F3E8689E2}" type="datetimeFigureOut">
               <a:rPr lang="de-DE" smtClean="0"/>
-              <a:t>08.07.2025</a:t>
+              <a:t>10.07.2025</a:t>
             </a:fld>
             <a:endParaRPr lang="de-DE"/>
           </a:p>
@@ -1825,7 +1830,7 @@
           <a:p>
             <a:fld id="{2D08528A-76E3-4B57-B31D-3A5F3E8689E2}" type="datetimeFigureOut">
               <a:rPr lang="de-DE" smtClean="0"/>
-              <a:t>08.07.2025</a:t>
+              <a:t>10.07.2025</a:t>
             </a:fld>
             <a:endParaRPr lang="de-DE"/>
           </a:p>
@@ -2102,7 +2107,7 @@
           <a:p>
             <a:fld id="{2D08528A-76E3-4B57-B31D-3A5F3E8689E2}" type="datetimeFigureOut">
               <a:rPr lang="de-DE" smtClean="0"/>
-              <a:t>08.07.2025</a:t>
+              <a:t>10.07.2025</a:t>
             </a:fld>
             <a:endParaRPr lang="de-DE"/>
           </a:p>
@@ -2355,7 +2360,7 @@
           <a:p>
             <a:fld id="{2D08528A-76E3-4B57-B31D-3A5F3E8689E2}" type="datetimeFigureOut">
               <a:rPr lang="de-DE" smtClean="0"/>
-              <a:t>08.07.2025</a:t>
+              <a:t>10.07.2025</a:t>
             </a:fld>
             <a:endParaRPr lang="de-DE"/>
           </a:p>
@@ -2568,7 +2573,7 @@
           <a:p>
             <a:fld id="{2D08528A-76E3-4B57-B31D-3A5F3E8689E2}" type="datetimeFigureOut">
               <a:rPr lang="de-DE" smtClean="0"/>
-              <a:t>08.07.2025</a:t>
+              <a:t>10.07.2025</a:t>
             </a:fld>
             <a:endParaRPr lang="de-DE"/>
           </a:p>
@@ -2995,7 +3000,7 @@
         </p:blipFill>
         <p:spPr>
           <a:xfrm>
-            <a:off x="0" y="216408"/>
+            <a:off x="0" y="7406"/>
             <a:ext cx="12192000" cy="6425184"/>
           </a:xfrm>
           <a:prstGeom prst="rect">
@@ -3107,6 +3112,30 @@
           </a:p>
         </p:txBody>
       </p:sp>
+      <p:pic>
+        <p:nvPicPr>
+          <p:cNvPr id="4" name="Picture 3"/>
+          <p:cNvPicPr>
+            <a:picLocks noChangeAspect="1"/>
+          </p:cNvPicPr>
+          <p:nvPr/>
+        </p:nvPicPr>
+        <p:blipFill>
+          <a:blip r:embed="rId3"/>
+          <a:stretch>
+            <a:fillRect/>
+          </a:stretch>
+        </p:blipFill>
+        <p:spPr>
+          <a:xfrm>
+            <a:off x="0" y="4547835"/>
+            <a:ext cx="6803371" cy="2307295"/>
+          </a:xfrm>
+          <a:prstGeom prst="rect">
+            <a:avLst/>
+          </a:prstGeom>
+        </p:spPr>
+      </p:pic>
     </p:spTree>
     <p:extLst>
       <p:ext uri="{BB962C8B-B14F-4D97-AF65-F5344CB8AC3E}">
@@ -3144,6 +3173,30 @@
           <a:chExt cx="0" cy="0"/>
         </a:xfrm>
       </p:grpSpPr>
+      <p:pic>
+        <p:nvPicPr>
+          <p:cNvPr id="4" name="Picture 3"/>
+          <p:cNvPicPr>
+            <a:picLocks noChangeAspect="1"/>
+          </p:cNvPicPr>
+          <p:nvPr/>
+        </p:nvPicPr>
+        <p:blipFill>
+          <a:blip r:embed="rId2"/>
+          <a:stretch>
+            <a:fillRect/>
+          </a:stretch>
+        </p:blipFill>
+        <p:spPr>
+          <a:xfrm>
+            <a:off x="3855177" y="3163659"/>
+            <a:ext cx="6972300" cy="2533650"/>
+          </a:xfrm>
+          <a:prstGeom prst="rect">
+            <a:avLst/>
+          </a:prstGeom>
+        </p:spPr>
+      </p:pic>
       <p:sp>
         <p:nvSpPr>
           <p:cNvPr id="2" name="Title 1"/>
@@ -3181,12 +3234,522 @@
             <p:ph idx="1"/>
           </p:nvPr>
         </p:nvSpPr>
-        <p:spPr/>
-        <p:txBody>
-          <a:bodyPr/>
-          <a:lstStyle/>
-          <a:p>
-            <a:endParaRPr lang="de-DE"/>
+        <p:spPr>
+          <a:xfrm>
+            <a:off x="838200" y="1463040"/>
+            <a:ext cx="10515600" cy="5394960"/>
+          </a:xfrm>
+        </p:spPr>
+        <p:txBody>
+          <a:bodyPr>
+            <a:normAutofit fontScale="92500" lnSpcReduction="10000"/>
+          </a:bodyPr>
+          <a:lstStyle/>
+          <a:p>
+            <a:r>
+              <a:rPr lang="de-DE" dirty="0" err="1" smtClean="0"/>
+              <a:t>Embed</a:t>
+            </a:r>
+            <a:r>
+              <a:rPr lang="de-DE" dirty="0" smtClean="0"/>
+              <a:t> </a:t>
+            </a:r>
+            <a:r>
+              <a:rPr lang="de-DE" dirty="0" err="1" smtClean="0"/>
+              <a:t>each</a:t>
+            </a:r>
+            <a:r>
+              <a:rPr lang="de-DE" dirty="0" smtClean="0"/>
+              <a:t> </a:t>
+            </a:r>
+            <a:r>
+              <a:rPr lang="de-DE" dirty="0" err="1" smtClean="0"/>
+              <a:t>node</a:t>
+            </a:r>
+            <a:r>
+              <a:rPr lang="de-DE" dirty="0" smtClean="0"/>
+              <a:t> in a </a:t>
+            </a:r>
+            <a:r>
+              <a:rPr lang="de-DE" dirty="0" err="1" smtClean="0"/>
+              <a:t>low</a:t>
+            </a:r>
+            <a:r>
+              <a:rPr lang="de-DE" dirty="0" smtClean="0"/>
+              <a:t> dimensional </a:t>
+            </a:r>
+            <a:r>
+              <a:rPr lang="de-DE" dirty="0" err="1" smtClean="0"/>
+              <a:t>space</a:t>
+            </a:r>
+            <a:r>
+              <a:rPr lang="de-DE" dirty="0" smtClean="0"/>
+              <a:t> </a:t>
+            </a:r>
+            <a:r>
+              <a:rPr lang="de-DE" dirty="0" err="1" smtClean="0"/>
+              <a:t>to</a:t>
+            </a:r>
+            <a:r>
+              <a:rPr lang="de-DE" dirty="0" smtClean="0"/>
+              <a:t> </a:t>
+            </a:r>
+            <a:r>
+              <a:rPr lang="de-DE" b="1" dirty="0" err="1" smtClean="0"/>
+              <a:t>encode</a:t>
+            </a:r>
+            <a:r>
+              <a:rPr lang="de-DE" b="1" dirty="0" smtClean="0"/>
+              <a:t> </a:t>
+            </a:r>
+            <a:r>
+              <a:rPr lang="de-DE" b="1" dirty="0" err="1" smtClean="0"/>
+              <a:t>key</a:t>
+            </a:r>
+            <a:r>
+              <a:rPr lang="de-DE" b="1" dirty="0" smtClean="0"/>
+              <a:t> </a:t>
+            </a:r>
+            <a:r>
+              <a:rPr lang="de-DE" b="1" dirty="0" err="1" smtClean="0"/>
+              <a:t>properties</a:t>
+            </a:r>
+            <a:r>
+              <a:rPr lang="de-DE" b="1" dirty="0" smtClean="0"/>
+              <a:t> </a:t>
+            </a:r>
+            <a:r>
+              <a:rPr lang="de-DE" dirty="0" err="1" smtClean="0"/>
+              <a:t>about</a:t>
+            </a:r>
+            <a:r>
+              <a:rPr lang="de-DE" dirty="0" smtClean="0"/>
+              <a:t> </a:t>
+            </a:r>
+            <a:r>
+              <a:rPr lang="de-DE" dirty="0" err="1" smtClean="0"/>
+              <a:t>their</a:t>
+            </a:r>
+            <a:r>
+              <a:rPr lang="de-DE" dirty="0" smtClean="0"/>
+              <a:t> </a:t>
+            </a:r>
+            <a:r>
+              <a:rPr lang="de-DE" dirty="0" err="1" smtClean="0"/>
+              <a:t>position</a:t>
+            </a:r>
+            <a:r>
+              <a:rPr lang="de-DE" dirty="0" smtClean="0"/>
+              <a:t> in </a:t>
+            </a:r>
+            <a:r>
+              <a:rPr lang="de-DE" dirty="0" err="1" smtClean="0"/>
+              <a:t>the</a:t>
+            </a:r>
+            <a:r>
+              <a:rPr lang="de-DE" dirty="0" smtClean="0"/>
+              <a:t> graph. </a:t>
+            </a:r>
+            <a:r>
+              <a:rPr lang="de-DE" dirty="0" err="1" smtClean="0"/>
+              <a:t>Is</a:t>
+            </a:r>
+            <a:r>
+              <a:rPr lang="de-DE" dirty="0" smtClean="0"/>
+              <a:t> </a:t>
+            </a:r>
+            <a:r>
+              <a:rPr lang="de-DE" dirty="0" err="1" smtClean="0"/>
+              <a:t>used</a:t>
+            </a:r>
+            <a:r>
+              <a:rPr lang="de-DE" dirty="0" smtClean="0"/>
+              <a:t> </a:t>
+            </a:r>
+            <a:r>
+              <a:rPr lang="en-US" dirty="0" smtClean="0"/>
+              <a:t>for </a:t>
+            </a:r>
+            <a:r>
+              <a:rPr lang="en-US" dirty="0"/>
+              <a:t>tasks such </a:t>
+            </a:r>
+            <a:r>
+              <a:rPr lang="en-US" dirty="0" smtClean="0"/>
+              <a:t>as </a:t>
+            </a:r>
+            <a:r>
+              <a:rPr lang="en-US" dirty="0"/>
+              <a:t>community detection </a:t>
+            </a:r>
+            <a:r>
+              <a:rPr lang="en-US" dirty="0" smtClean="0"/>
+              <a:t>(see below), </a:t>
+            </a:r>
+            <a:r>
+              <a:rPr lang="en-US" dirty="0"/>
+              <a:t>link </a:t>
+            </a:r>
+            <a:r>
+              <a:rPr lang="en-US" dirty="0" smtClean="0"/>
+              <a:t>prediction, and node classification. </a:t>
+            </a:r>
+          </a:p>
+          <a:p>
+            <a:r>
+              <a:rPr lang="en-US" dirty="0" smtClean="0"/>
+              <a:t> In temporal networks, one can </a:t>
+            </a:r>
+            <a:r>
+              <a:rPr lang="en-US" b="1" dirty="0" smtClean="0"/>
+              <a:t>follow the trajectory </a:t>
+            </a:r>
+            <a:r>
+              <a:rPr lang="en-US" dirty="0" smtClean="0"/>
+              <a:t>of each node in the embedding space. </a:t>
+            </a:r>
+          </a:p>
+          <a:p>
+            <a:endParaRPr lang="en-US" dirty="0"/>
+          </a:p>
+          <a:p>
+            <a:pPr marL="0" indent="0">
+              <a:buNone/>
+            </a:pPr>
+            <a:endParaRPr lang="en-US" sz="1400" dirty="0" smtClean="0">
+              <a:solidFill>
+                <a:schemeClr val="bg1">
+                  <a:lumMod val="65000"/>
+                </a:schemeClr>
+              </a:solidFill>
+            </a:endParaRPr>
+          </a:p>
+          <a:p>
+            <a:pPr marL="0" indent="0">
+              <a:buNone/>
+            </a:pPr>
+            <a:endParaRPr lang="en-US" sz="1400" dirty="0">
+              <a:solidFill>
+                <a:schemeClr val="bg1">
+                  <a:lumMod val="65000"/>
+                </a:schemeClr>
+              </a:solidFill>
+            </a:endParaRPr>
+          </a:p>
+          <a:p>
+            <a:pPr marL="0" indent="0">
+              <a:buNone/>
+            </a:pPr>
+            <a:endParaRPr lang="en-US" sz="1400" dirty="0">
+              <a:solidFill>
+                <a:schemeClr val="bg1">
+                  <a:lumMod val="65000"/>
+                </a:schemeClr>
+              </a:solidFill>
+            </a:endParaRPr>
+          </a:p>
+          <a:p>
+            <a:pPr marL="0" indent="0">
+              <a:buNone/>
+            </a:pPr>
+            <a:endParaRPr lang="en-US" sz="1400" dirty="0" smtClean="0">
+              <a:solidFill>
+                <a:schemeClr val="bg1">
+                  <a:lumMod val="65000"/>
+                </a:schemeClr>
+              </a:solidFill>
+            </a:endParaRPr>
+          </a:p>
+          <a:p>
+            <a:pPr marL="0" indent="0">
+              <a:buNone/>
+            </a:pPr>
+            <a:r>
+              <a:rPr lang="en-US" sz="1400" dirty="0" smtClean="0">
+                <a:solidFill>
+                  <a:schemeClr val="bg1">
+                    <a:lumMod val="65000"/>
+                  </a:schemeClr>
+                </a:solidFill>
+              </a:rPr>
+              <a:t>On static graphs:</a:t>
+            </a:r>
+            <a:endParaRPr lang="en-US" sz="1400" dirty="0">
+              <a:solidFill>
+                <a:schemeClr val="bg1">
+                  <a:lumMod val="65000"/>
+                </a:schemeClr>
+              </a:solidFill>
+            </a:endParaRPr>
+          </a:p>
+          <a:p>
+            <a:pPr marL="0" indent="0">
+              <a:buNone/>
+            </a:pPr>
+            <a:r>
+              <a:rPr lang="en-US" sz="1400" dirty="0" smtClean="0">
+                <a:solidFill>
+                  <a:schemeClr val="bg1">
+                    <a:lumMod val="65000"/>
+                  </a:schemeClr>
+                </a:solidFill>
+              </a:rPr>
+              <a:t>- Andrew </a:t>
+            </a:r>
+            <a:r>
+              <a:rPr lang="en-US" sz="1400" dirty="0">
+                <a:solidFill>
+                  <a:schemeClr val="bg1">
+                    <a:lumMod val="65000"/>
+                  </a:schemeClr>
+                </a:solidFill>
+              </a:rPr>
+              <a:t>Y Ng, Michael I Jordan, and </a:t>
+            </a:r>
+            <a:r>
+              <a:rPr lang="en-US" sz="1400" dirty="0" err="1">
+                <a:solidFill>
+                  <a:schemeClr val="bg1">
+                    <a:lumMod val="65000"/>
+                  </a:schemeClr>
+                </a:solidFill>
+              </a:rPr>
+              <a:t>Yair</a:t>
+            </a:r>
+            <a:r>
+              <a:rPr lang="en-US" sz="1400" dirty="0">
+                <a:solidFill>
+                  <a:schemeClr val="bg1">
+                    <a:lumMod val="65000"/>
+                  </a:schemeClr>
+                </a:solidFill>
+              </a:rPr>
+              <a:t> Weiss. 2002. On spectral </a:t>
+            </a:r>
+            <a:r>
+              <a:rPr lang="en-US" sz="1400" dirty="0" smtClean="0">
+                <a:solidFill>
+                  <a:schemeClr val="bg1">
+                    <a:lumMod val="65000"/>
+                  </a:schemeClr>
+                </a:solidFill>
+              </a:rPr>
+              <a:t>clustering: Analysis </a:t>
+            </a:r>
+            <a:r>
+              <a:rPr lang="en-US" sz="1400" dirty="0">
+                <a:solidFill>
+                  <a:schemeClr val="bg1">
+                    <a:lumMod val="65000"/>
+                  </a:schemeClr>
+                </a:solidFill>
+              </a:rPr>
+              <a:t>and an </a:t>
+            </a:r>
+            <a:r>
+              <a:rPr lang="en-US" sz="1400" dirty="0" smtClean="0">
+                <a:solidFill>
+                  <a:schemeClr val="bg1">
+                    <a:lumMod val="65000"/>
+                  </a:schemeClr>
+                </a:solidFill>
+              </a:rPr>
+              <a:t>algorithm</a:t>
+            </a:r>
+          </a:p>
+          <a:p>
+            <a:pPr marL="0" indent="0">
+              <a:buNone/>
+            </a:pPr>
+            <a:r>
+              <a:rPr lang="en-US" sz="1400" dirty="0" smtClean="0">
+                <a:solidFill>
+                  <a:schemeClr val="bg1">
+                    <a:lumMod val="65000"/>
+                  </a:schemeClr>
+                </a:solidFill>
+              </a:rPr>
+              <a:t>- Pascal </a:t>
+            </a:r>
+            <a:r>
+              <a:rPr lang="en-US" sz="1400" dirty="0">
+                <a:solidFill>
+                  <a:schemeClr val="bg1">
+                    <a:lumMod val="65000"/>
+                  </a:schemeClr>
+                </a:solidFill>
+              </a:rPr>
+              <a:t>Pons and </a:t>
+            </a:r>
+            <a:r>
+              <a:rPr lang="en-US" sz="1400" dirty="0" err="1">
+                <a:solidFill>
+                  <a:schemeClr val="bg1">
+                    <a:lumMod val="65000"/>
+                  </a:schemeClr>
+                </a:solidFill>
+              </a:rPr>
+              <a:t>Matthieu</a:t>
+            </a:r>
+            <a:r>
+              <a:rPr lang="en-US" sz="1400" dirty="0">
+                <a:solidFill>
+                  <a:schemeClr val="bg1">
+                    <a:lumMod val="65000"/>
+                  </a:schemeClr>
+                </a:solidFill>
+              </a:rPr>
+              <a:t> </a:t>
+            </a:r>
+            <a:r>
+              <a:rPr lang="en-US" sz="1400" dirty="0" err="1">
+                <a:solidFill>
+                  <a:schemeClr val="bg1">
+                    <a:lumMod val="65000"/>
+                  </a:schemeClr>
+                </a:solidFill>
+              </a:rPr>
+              <a:t>Latapy</a:t>
+            </a:r>
+            <a:r>
+              <a:rPr lang="en-US" sz="1400" dirty="0">
+                <a:solidFill>
+                  <a:schemeClr val="bg1">
+                    <a:lumMod val="65000"/>
+                  </a:schemeClr>
+                </a:solidFill>
+              </a:rPr>
+              <a:t>. 2006. Computing communities in large </a:t>
+            </a:r>
+            <a:r>
+              <a:rPr lang="en-US" sz="1400" dirty="0" smtClean="0">
+                <a:solidFill>
+                  <a:schemeClr val="bg1">
+                    <a:lumMod val="65000"/>
+                  </a:schemeClr>
+                </a:solidFill>
+              </a:rPr>
+              <a:t>net-works </a:t>
+            </a:r>
+            <a:r>
+              <a:rPr lang="en-US" sz="1400" dirty="0">
+                <a:solidFill>
+                  <a:schemeClr val="bg1">
+                    <a:lumMod val="65000"/>
+                  </a:schemeClr>
+                </a:solidFill>
+              </a:rPr>
+              <a:t>using random walks. </a:t>
+            </a:r>
+            <a:endParaRPr lang="en-US" sz="1400" dirty="0" smtClean="0">
+              <a:solidFill>
+                <a:schemeClr val="bg1">
+                  <a:lumMod val="65000"/>
+                </a:schemeClr>
+              </a:solidFill>
+            </a:endParaRPr>
+          </a:p>
+          <a:p>
+            <a:pPr marL="0" indent="0">
+              <a:buNone/>
+            </a:pPr>
+            <a:r>
+              <a:rPr lang="en-US" sz="1400" dirty="0" smtClean="0">
+                <a:solidFill>
+                  <a:schemeClr val="bg1">
+                    <a:lumMod val="65000"/>
+                  </a:schemeClr>
+                </a:solidFill>
+              </a:rPr>
+              <a:t>On temporal graphs:</a:t>
+            </a:r>
+          </a:p>
+          <a:p>
+            <a:pPr marL="0" indent="0">
+              <a:buNone/>
+            </a:pPr>
+            <a:r>
+              <a:rPr lang="en-US" sz="1400" dirty="0">
+                <a:solidFill>
+                  <a:schemeClr val="bg1">
+                    <a:lumMod val="65000"/>
+                  </a:schemeClr>
+                </a:solidFill>
+              </a:rPr>
+              <a:t> </a:t>
+            </a:r>
+            <a:r>
+              <a:rPr lang="en-US" sz="1400" dirty="0" smtClean="0">
+                <a:solidFill>
+                  <a:schemeClr val="bg1">
+                    <a:lumMod val="65000"/>
+                  </a:schemeClr>
+                </a:solidFill>
+              </a:rPr>
+              <a:t>- </a:t>
+            </a:r>
+            <a:r>
+              <a:rPr lang="en-US" sz="1400" dirty="0" err="1" smtClean="0">
+                <a:solidFill>
+                  <a:schemeClr val="bg1">
+                    <a:lumMod val="65000"/>
+                  </a:schemeClr>
+                </a:solidFill>
+              </a:rPr>
+              <a:t>DySAT</a:t>
+            </a:r>
+            <a:r>
+              <a:rPr lang="en-US" sz="1400" dirty="0" smtClean="0">
+                <a:solidFill>
+                  <a:schemeClr val="bg1">
+                    <a:lumMod val="65000"/>
+                  </a:schemeClr>
+                </a:solidFill>
+              </a:rPr>
+              <a:t> trained with attention mechanism on slices to predict future connection. This allows to study which nodes are particularly </a:t>
+            </a:r>
+            <a:r>
+              <a:rPr lang="en-US" sz="1400" dirty="0" err="1" smtClean="0">
+                <a:solidFill>
+                  <a:schemeClr val="bg1">
+                    <a:lumMod val="65000"/>
+                  </a:schemeClr>
+                </a:solidFill>
+              </a:rPr>
+              <a:t>influencial</a:t>
+            </a:r>
+            <a:r>
+              <a:rPr lang="en-US" sz="1400" dirty="0" smtClean="0">
+                <a:solidFill>
+                  <a:schemeClr val="bg1">
+                    <a:lumMod val="65000"/>
+                  </a:schemeClr>
+                </a:solidFill>
+              </a:rPr>
+              <a:t> in the network.</a:t>
+            </a:r>
+          </a:p>
+          <a:p>
+            <a:pPr marL="0" indent="0">
+              <a:buNone/>
+            </a:pPr>
+            <a:r>
+              <a:rPr lang="en-US" sz="1400" dirty="0" smtClean="0">
+                <a:solidFill>
+                  <a:schemeClr val="bg1">
+                    <a:lumMod val="65000"/>
+                  </a:schemeClr>
+                </a:solidFill>
+              </a:rPr>
+              <a:t>- skip-gram</a:t>
+            </a:r>
+            <a:endParaRPr lang="de-DE" sz="1400" dirty="0">
+              <a:solidFill>
+                <a:schemeClr val="bg1">
+                  <a:lumMod val="65000"/>
+                </a:schemeClr>
+              </a:solidFill>
+            </a:endParaRPr>
           </a:p>
         </p:txBody>
       </p:sp>
@@ -6515,10 +7078,22 @@
               <a:buNone/>
             </a:pPr>
             <a:r>
-              <a:rPr lang="de-DE" dirty="0" err="1" smtClean="0"/>
+              <a:rPr lang="de-DE" dirty="0" err="1" smtClean="0">
+                <a:solidFill>
+                  <a:schemeClr val="bg2">
+                    <a:lumMod val="50000"/>
+                  </a:schemeClr>
+                </a:solidFill>
+              </a:rPr>
               <a:t>Or</a:t>
             </a:r>
-            <a:endParaRPr lang="de-DE" dirty="0" smtClean="0"/>
+            <a:endParaRPr lang="de-DE" dirty="0" smtClean="0">
+              <a:solidFill>
+                <a:schemeClr val="bg2">
+                  <a:lumMod val="50000"/>
+                </a:schemeClr>
+              </a:solidFill>
+            </a:endParaRPr>
           </a:p>
           <a:p>
             <a:pPr marL="0" indent="0">

</xml_diff>